<commit_message>
updates refs to README files
</commit_message>
<xml_diff>
--- a/doc/GEOSldas-tutorial.pptx
+++ b/doc/GEOSldas-tutorial.pptx
@@ -176,7 +176,7 @@
   </p:defaultTextStyle>
   <p:extLst>
     <p:ext uri="{EFAFB233-063F-42B5-8137-9DF3F51BA10A}">
-      <p15:sldGuideLst xmlns:p15="http://schemas.microsoft.com/office/powerpoint/2012/main">
+      <p15:sldGuideLst xmlns="" xmlns:p15="http://schemas.microsoft.com/office/powerpoint/2012/main">
         <p15:guide id="1" orient="horz" pos="480" userDrawn="1">
           <p15:clr>
             <a:srgbClr val="A4A3A4"/>
@@ -190,7 +190,7 @@
       </p15:sldGuideLst>
     </p:ext>
     <p:ext uri="{2D200454-40CA-4A62-9FC3-DE9A4176ACB9}">
-      <p15:notesGuideLst xmlns:p15="http://schemas.microsoft.com/office/powerpoint/2012/main"/>
+      <p15:notesGuideLst xmlns="" xmlns:p15="http://schemas.microsoft.com/office/powerpoint/2012/main"/>
     </p:ext>
   </p:extLst>
 </p:presentation>
@@ -201,21 +201,21 @@
   <p:cmAuthor id="1" name="RR" initials="RR" lastIdx="38" clrIdx="0">
     <p:extLst>
       <p:ext uri="{19B8F6BF-5375-455C-9EA6-DF929625EA0E}">
-        <p15:presenceInfo xmlns:p15="http://schemas.microsoft.com/office/powerpoint/2012/main" userId="RR" providerId="None"/>
+        <p15:presenceInfo xmlns="" xmlns:p15="http://schemas.microsoft.com/office/powerpoint/2012/main" userId="RR" providerId="None"/>
       </p:ext>
     </p:extLst>
   </p:cmAuthor>
   <p:cmAuthor id="2" name="Reichle, Rolf H. (GSFC-6101)" initials="RRH(" lastIdx="5" clrIdx="1">
     <p:extLst>
       <p:ext uri="{19B8F6BF-5375-455C-9EA6-DF929625EA0E}">
-        <p15:presenceInfo xmlns:p15="http://schemas.microsoft.com/office/powerpoint/2012/main" userId="S-1-5-21-330711430-3775241029-4075259233-100029" providerId="AD"/>
+        <p15:presenceInfo xmlns="" xmlns:p15="http://schemas.microsoft.com/office/powerpoint/2012/main" userId="S-1-5-21-330711430-3775241029-4075259233-100029" providerId="AD"/>
       </p:ext>
     </p:extLst>
   </p:cmAuthor>
   <p:cmAuthor id="3" name="Microsoft Office User" initials="MOU" lastIdx="11" clrIdx="2">
     <p:extLst>
       <p:ext uri="{19B8F6BF-5375-455C-9EA6-DF929625EA0E}">
-        <p15:presenceInfo xmlns:p15="http://schemas.microsoft.com/office/powerpoint/2012/main" userId="Microsoft Office User" providerId="None"/>
+        <p15:presenceInfo xmlns="" xmlns:p15="http://schemas.microsoft.com/office/powerpoint/2012/main" userId="Microsoft Office User" providerId="None"/>
       </p:ext>
     </p:extLst>
   </p:cmAuthor>
@@ -335,7 +335,7 @@
               <a:pPr>
                 <a:defRPr/>
               </a:pPr>
-              <a:t>12/6/19</a:t>
+              <a:t>12/10/2019</a:t>
             </a:fld>
             <a:endParaRPr lang="en-US"/>
           </a:p>
@@ -3567,7 +3567,7 @@
               <a:pPr>
                 <a:defRPr/>
               </a:pPr>
-              <a:t>12/6/19</a:t>
+              <a:t>12/10/2019</a:t>
             </a:fld>
             <a:endParaRPr lang="en-US"/>
           </a:p>
@@ -3762,7 +3762,7 @@
               <a:pPr>
                 <a:defRPr/>
               </a:pPr>
-              <a:t>12/6/19</a:t>
+              <a:t>12/10/2019</a:t>
             </a:fld>
             <a:endParaRPr lang="en-US"/>
           </a:p>
@@ -3967,7 +3967,7 @@
               <a:pPr>
                 <a:defRPr/>
               </a:pPr>
-              <a:t>12/6/19</a:t>
+              <a:t>12/10/2019</a:t>
             </a:fld>
             <a:endParaRPr lang="en-US"/>
           </a:p>
@@ -4162,7 +4162,7 @@
               <a:pPr>
                 <a:defRPr/>
               </a:pPr>
-              <a:t>12/6/19</a:t>
+              <a:t>12/10/2019</a:t>
             </a:fld>
             <a:endParaRPr lang="en-US"/>
           </a:p>
@@ -4434,7 +4434,7 @@
               <a:pPr>
                 <a:defRPr/>
               </a:pPr>
-              <a:t>12/6/19</a:t>
+              <a:t>12/10/2019</a:t>
             </a:fld>
             <a:endParaRPr lang="en-US"/>
           </a:p>
@@ -4690,7 +4690,7 @@
               <a:pPr>
                 <a:defRPr/>
               </a:pPr>
-              <a:t>12/6/19</a:t>
+              <a:t>12/10/2019</a:t>
             </a:fld>
             <a:endParaRPr lang="en-US"/>
           </a:p>
@@ -5081,7 +5081,7 @@
               <a:pPr>
                 <a:defRPr/>
               </a:pPr>
-              <a:t>12/6/19</a:t>
+              <a:t>12/10/2019</a:t>
             </a:fld>
             <a:endParaRPr lang="en-US"/>
           </a:p>
@@ -5225,7 +5225,7 @@
               <a:pPr>
                 <a:defRPr/>
               </a:pPr>
-              <a:t>12/6/19</a:t>
+              <a:t>12/10/2019</a:t>
             </a:fld>
             <a:endParaRPr lang="en-US"/>
           </a:p>
@@ -5347,7 +5347,7 @@
               <a:pPr>
                 <a:defRPr/>
               </a:pPr>
-              <a:t>12/6/19</a:t>
+              <a:t>12/10/2019</a:t>
             </a:fld>
             <a:endParaRPr lang="en-US"/>
           </a:p>
@@ -5649,7 +5649,7 @@
               <a:pPr>
                 <a:defRPr/>
               </a:pPr>
-              <a:t>12/6/19</a:t>
+              <a:t>12/10/2019</a:t>
             </a:fld>
             <a:endParaRPr lang="en-US"/>
           </a:p>
@@ -5931,7 +5931,7 @@
               <a:pPr>
                 <a:defRPr/>
               </a:pPr>
-              <a:t>12/6/19</a:t>
+              <a:t>12/10/2019</a:t>
             </a:fld>
             <a:endParaRPr lang="en-US"/>
           </a:p>
@@ -6227,7 +6227,7 @@
               <a:pPr>
                 <a:defRPr/>
               </a:pPr>
-              <a:t>12/6/19</a:t>
+              <a:t>12/10/2019</a:t>
             </a:fld>
             <a:endParaRPr lang="en-US"/>
           </a:p>
@@ -7345,7 +7345,7 @@
           <p:cNvPr id="4" name="TextBox 1">
             <a:extLst>
               <a:ext uri="{FF2B5EF4-FFF2-40B4-BE49-F238E27FC236}">
-                <a16:creationId xmlns:a16="http://schemas.microsoft.com/office/drawing/2014/main" id="{43C050FF-2175-F049-90DF-CD37C29079FF}"/>
+                <a16:creationId xmlns="" xmlns:a16="http://schemas.microsoft.com/office/drawing/2014/main" id="{43C050FF-2175-F049-90DF-CD37C29079FF}"/>
               </a:ext>
             </a:extLst>
           </p:cNvPr>
@@ -7535,7 +7535,7 @@
           <p:cNvPr id="2" name="Rectangle 1">
             <a:extLst>
               <a:ext uri="{FF2B5EF4-FFF2-40B4-BE49-F238E27FC236}">
-                <a16:creationId xmlns:a16="http://schemas.microsoft.com/office/drawing/2014/main" id="{3039D0B7-AA59-FD4D-94F0-07C79BB8E8C9}"/>
+                <a16:creationId xmlns="" xmlns:a16="http://schemas.microsoft.com/office/drawing/2014/main" id="{3039D0B7-AA59-FD4D-94F0-07C79BB8E8C9}"/>
               </a:ext>
             </a:extLst>
           </p:cNvPr>
@@ -8807,7 +8807,7 @@
           <p:cNvPr id="4" name="TextBox 1">
             <a:extLst>
               <a:ext uri="{FF2B5EF4-FFF2-40B4-BE49-F238E27FC236}">
-                <a16:creationId xmlns:a16="http://schemas.microsoft.com/office/drawing/2014/main" id="{0A2C1B91-AD52-3446-BE33-E91F8B83086D}"/>
+                <a16:creationId xmlns="" xmlns:a16="http://schemas.microsoft.com/office/drawing/2014/main" id="{0A2C1B91-AD52-3446-BE33-E91F8B83086D}"/>
               </a:ext>
             </a:extLst>
           </p:cNvPr>
@@ -9558,30 +9558,45 @@
               <a:buNone/>
             </a:pPr>
             <a:r>
+              <a:rPr lang="en-US" altLang="en-US" sz="1600" dirty="0" smtClean="0">
+                <a:latin typeface="Courier New" panose="02070309020205020404" pitchFamily="49" charset="0"/>
+                <a:cs typeface="Courier New" panose="02070309020205020404" pitchFamily="49" charset="0"/>
+              </a:rPr>
+              <a:t>#    4 : f525_land</a:t>
+            </a:r>
+            <a:endParaRPr lang="en-US" altLang="en-US" sz="1600" dirty="0">
+              <a:latin typeface="Courier New" panose="02070309020205020404" pitchFamily="49" charset="0"/>
+              <a:cs typeface="Courier New" panose="02070309020205020404" pitchFamily="49" charset="0"/>
+            </a:endParaRPr>
+          </a:p>
+          <a:p>
+            <a:pPr eaLnBrk="1" hangingPunct="1">
+              <a:lnSpc>
+                <a:spcPct val="100000"/>
+              </a:lnSpc>
+              <a:spcBef>
+                <a:spcPct val="0"/>
+              </a:spcBef>
+              <a:buNone/>
+            </a:pPr>
+            <a:r>
               <a:rPr lang="en-US" altLang="en-US" sz="1600" dirty="0">
                 <a:latin typeface="Courier New" panose="02070309020205020404" pitchFamily="49" charset="0"/>
                 <a:cs typeface="Courier New" panose="02070309020205020404" pitchFamily="49" charset="0"/>
               </a:rPr>
-              <a:t>#</a:t>
-            </a:r>
-          </a:p>
-          <a:p>
-            <a:pPr eaLnBrk="1" hangingPunct="1">
-              <a:lnSpc>
-                <a:spcPct val="100000"/>
-              </a:lnSpc>
-              <a:spcBef>
-                <a:spcPct val="0"/>
-              </a:spcBef>
-              <a:buNone/>
-            </a:pPr>
-            <a:r>
-              <a:rPr lang="en-US" altLang="en-US" sz="1600" dirty="0">
-                <a:latin typeface="Courier New" panose="02070309020205020404" pitchFamily="49" charset="0"/>
-                <a:cs typeface="Courier New" panose="02070309020205020404" pitchFamily="49" charset="0"/>
-              </a:rPr>
-              <a:t>Z0_FORMULATION                 : 3</a:t>
-            </a:r>
+              <a:t>Z0_FORMULATION                 : </a:t>
+            </a:r>
+            <a:r>
+              <a:rPr lang="en-US" altLang="en-US" sz="1600" dirty="0" smtClean="0">
+                <a:latin typeface="Courier New" panose="02070309020205020404" pitchFamily="49" charset="0"/>
+                <a:cs typeface="Courier New" panose="02070309020205020404" pitchFamily="49" charset="0"/>
+              </a:rPr>
+              <a:t>4</a:t>
+            </a:r>
+            <a:endParaRPr lang="en-US" altLang="en-US" sz="1600" dirty="0">
+              <a:latin typeface="Courier New" panose="02070309020205020404" pitchFamily="49" charset="0"/>
+              <a:cs typeface="Courier New" panose="02070309020205020404" pitchFamily="49" charset="0"/>
+            </a:endParaRPr>
           </a:p>
           <a:p>
             <a:pPr eaLnBrk="1" hangingPunct="1">
@@ -9695,7 +9710,7 @@
           <p:cNvPr id="4" name="TextBox 1">
             <a:extLst>
               <a:ext uri="{FF2B5EF4-FFF2-40B4-BE49-F238E27FC236}">
-                <a16:creationId xmlns:a16="http://schemas.microsoft.com/office/drawing/2014/main" id="{BC67E993-F431-2349-9828-19CB4C4AC14C}"/>
+                <a16:creationId xmlns="" xmlns:a16="http://schemas.microsoft.com/office/drawing/2014/main" id="{BC67E993-F431-2349-9828-19CB4C4AC14C}"/>
               </a:ext>
             </a:extLst>
           </p:cNvPr>
@@ -10496,7 +10511,7 @@
           <p:cNvPr id="4" name="TextBox 1">
             <a:extLst>
               <a:ext uri="{FF2B5EF4-FFF2-40B4-BE49-F238E27FC236}">
-                <a16:creationId xmlns:a16="http://schemas.microsoft.com/office/drawing/2014/main" id="{BC67E993-F431-2349-9828-19CB4C4AC14C}"/>
+                <a16:creationId xmlns="" xmlns:a16="http://schemas.microsoft.com/office/drawing/2014/main" id="{BC67E993-F431-2349-9828-19CB4C4AC14C}"/>
               </a:ext>
             </a:extLst>
           </p:cNvPr>
@@ -11431,7 +11446,7 @@
           <p:cNvPr id="4" name="TextBox 1">
             <a:extLst>
               <a:ext uri="{FF2B5EF4-FFF2-40B4-BE49-F238E27FC236}">
-                <a16:creationId xmlns:a16="http://schemas.microsoft.com/office/drawing/2014/main" id="{BC67E993-F431-2349-9828-19CB4C4AC14C}"/>
+                <a16:creationId xmlns="" xmlns:a16="http://schemas.microsoft.com/office/drawing/2014/main" id="{BC67E993-F431-2349-9828-19CB4C4AC14C}"/>
               </a:ext>
             </a:extLst>
           </p:cNvPr>
@@ -12274,7 +12289,7 @@
           <p:cNvPr id="4" name="TextBox 1">
             <a:extLst>
               <a:ext uri="{FF2B5EF4-FFF2-40B4-BE49-F238E27FC236}">
-                <a16:creationId xmlns:a16="http://schemas.microsoft.com/office/drawing/2014/main" id="{66EA72C2-1A7B-3241-9DCF-B26B9EA656CE}"/>
+                <a16:creationId xmlns="" xmlns:a16="http://schemas.microsoft.com/office/drawing/2014/main" id="{66EA72C2-1A7B-3241-9DCF-B26B9EA656CE}"/>
               </a:ext>
             </a:extLst>
           </p:cNvPr>
@@ -13168,7 +13183,7 @@
           <p:cNvPr id="4" name="TextBox 1">
             <a:extLst>
               <a:ext uri="{FF2B5EF4-FFF2-40B4-BE49-F238E27FC236}">
-                <a16:creationId xmlns:a16="http://schemas.microsoft.com/office/drawing/2014/main" id="{EA6833A0-6FF5-4144-B32D-E90F9C12D26E}"/>
+                <a16:creationId xmlns="" xmlns:a16="http://schemas.microsoft.com/office/drawing/2014/main" id="{EA6833A0-6FF5-4144-B32D-E90F9C12D26E}"/>
               </a:ext>
             </a:extLst>
           </p:cNvPr>
@@ -14110,7 +14125,7 @@
           <p:cNvPr id="6" name="TextBox 1">
             <a:extLst>
               <a:ext uri="{FF2B5EF4-FFF2-40B4-BE49-F238E27FC236}">
-                <a16:creationId xmlns:a16="http://schemas.microsoft.com/office/drawing/2014/main" id="{7FC34D51-735D-584B-862E-1A081F2B9EF9}"/>
+                <a16:creationId xmlns="" xmlns:a16="http://schemas.microsoft.com/office/drawing/2014/main" id="{7FC34D51-735D-584B-862E-1A081F2B9EF9}"/>
               </a:ext>
             </a:extLst>
           </p:cNvPr>
@@ -14300,7 +14315,7 @@
           <p:cNvPr id="4" name="CustomShape 3">
             <a:extLst>
               <a:ext uri="{FF2B5EF4-FFF2-40B4-BE49-F238E27FC236}">
-                <a16:creationId xmlns:a16="http://schemas.microsoft.com/office/drawing/2014/main" id="{35383346-C420-A848-8F58-377AA545A618}"/>
+                <a16:creationId xmlns="" xmlns:a16="http://schemas.microsoft.com/office/drawing/2014/main" id="{35383346-C420-A848-8F58-377AA545A618}"/>
               </a:ext>
             </a:extLst>
           </p:cNvPr>
@@ -14451,7 +14466,7 @@
           <p:cNvPr id="3" name="Straight Arrow Connector 2">
             <a:extLst>
               <a:ext uri="{FF2B5EF4-FFF2-40B4-BE49-F238E27FC236}">
-                <a16:creationId xmlns:a16="http://schemas.microsoft.com/office/drawing/2014/main" id="{B8552650-82DD-4847-85C5-D1578CE3985F}"/>
+                <a16:creationId xmlns="" xmlns:a16="http://schemas.microsoft.com/office/drawing/2014/main" id="{B8552650-82DD-4847-85C5-D1578CE3985F}"/>
               </a:ext>
             </a:extLst>
           </p:cNvPr>
@@ -26947,8 +26962,19 @@
                 <a:latin typeface="Courier New" panose="02070309020205020404" pitchFamily="49" charset="0"/>
                 <a:cs typeface="Courier New" panose="02070309020205020404" pitchFamily="49" charset="0"/>
               </a:rPr>
-              <a:t>Z0_FORMULATION:                     3</a:t>
-            </a:r>
+              <a:t>Z0_FORMULATION:                     </a:t>
+            </a:r>
+            <a:r>
+              <a:rPr lang="is-IS" altLang="en-US" sz="1200" dirty="0" smtClean="0">
+                <a:latin typeface="Courier New" panose="02070309020205020404" pitchFamily="49" charset="0"/>
+                <a:cs typeface="Courier New" panose="02070309020205020404" pitchFamily="49" charset="0"/>
+              </a:rPr>
+              <a:t>4</a:t>
+            </a:r>
+            <a:endParaRPr lang="is-IS" altLang="en-US" sz="1200" dirty="0">
+              <a:latin typeface="Courier New" panose="02070309020205020404" pitchFamily="49" charset="0"/>
+              <a:cs typeface="Courier New" panose="02070309020205020404" pitchFamily="49" charset="0"/>
+            </a:endParaRPr>
           </a:p>
           <a:p>
             <a:pPr eaLnBrk="1" hangingPunct="1">
@@ -29284,35 +29310,35 @@
                 <a:gridCol w="896458">
                   <a:extLst>
                     <a:ext uri="{9D8B030D-6E8A-4147-A177-3AD203B41FA5}">
-                      <a16:colId xmlns:a16="http://schemas.microsoft.com/office/drawing/2014/main" val="20000"/>
+                      <a16:colId xmlns="" xmlns:a16="http://schemas.microsoft.com/office/drawing/2014/main" val="20000"/>
                     </a:ext>
                   </a:extLst>
                 </a:gridCol>
                 <a:gridCol w="1816924">
                   <a:extLst>
                     <a:ext uri="{9D8B030D-6E8A-4147-A177-3AD203B41FA5}">
-                      <a16:colId xmlns:a16="http://schemas.microsoft.com/office/drawing/2014/main" val="20001"/>
+                      <a16:colId xmlns="" xmlns:a16="http://schemas.microsoft.com/office/drawing/2014/main" val="20001"/>
                     </a:ext>
                   </a:extLst>
                 </a:gridCol>
                 <a:gridCol w="1353787">
                   <a:extLst>
                     <a:ext uri="{9D8B030D-6E8A-4147-A177-3AD203B41FA5}">
-                      <a16:colId xmlns:a16="http://schemas.microsoft.com/office/drawing/2014/main" val="20002"/>
+                      <a16:colId xmlns="" xmlns:a16="http://schemas.microsoft.com/office/drawing/2014/main" val="20002"/>
                     </a:ext>
                   </a:extLst>
                 </a:gridCol>
                 <a:gridCol w="1104406">
                   <a:extLst>
                     <a:ext uri="{9D8B030D-6E8A-4147-A177-3AD203B41FA5}">
-                      <a16:colId xmlns:a16="http://schemas.microsoft.com/office/drawing/2014/main" val="20003"/>
+                      <a16:colId xmlns="" xmlns:a16="http://schemas.microsoft.com/office/drawing/2014/main" val="20003"/>
                     </a:ext>
                   </a:extLst>
                 </a:gridCol>
                 <a:gridCol w="5964599">
                   <a:extLst>
                     <a:ext uri="{9D8B030D-6E8A-4147-A177-3AD203B41FA5}">
-                      <a16:colId xmlns:a16="http://schemas.microsoft.com/office/drawing/2014/main" val="20004"/>
+                      <a16:colId xmlns="" xmlns:a16="http://schemas.microsoft.com/office/drawing/2014/main" val="20004"/>
                     </a:ext>
                   </a:extLst>
                 </a:gridCol>
@@ -29396,7 +29422,7 @@
                 </a:tc>
                 <a:extLst>
                   <a:ext uri="{0D108BD9-81ED-4DB2-BD59-A6C34878D82A}">
-                    <a16:rowId xmlns:a16="http://schemas.microsoft.com/office/drawing/2014/main" val="10000"/>
+                    <a16:rowId xmlns="" xmlns:a16="http://schemas.microsoft.com/office/drawing/2014/main" val="10000"/>
                   </a:ext>
                 </a:extLst>
               </a:tr>
@@ -29659,7 +29685,7 @@
                 </a:tc>
                 <a:extLst>
                   <a:ext uri="{0D108BD9-81ED-4DB2-BD59-A6C34878D82A}">
-                    <a16:rowId xmlns:a16="http://schemas.microsoft.com/office/drawing/2014/main" val="10001"/>
+                    <a16:rowId xmlns="" xmlns:a16="http://schemas.microsoft.com/office/drawing/2014/main" val="10001"/>
                   </a:ext>
                 </a:extLst>
               </a:tr>
@@ -29908,7 +29934,7 @@
                 </a:tc>
                 <a:extLst>
                   <a:ext uri="{0D108BD9-81ED-4DB2-BD59-A6C34878D82A}">
-                    <a16:rowId xmlns:a16="http://schemas.microsoft.com/office/drawing/2014/main" val="10002"/>
+                    <a16:rowId xmlns="" xmlns:a16="http://schemas.microsoft.com/office/drawing/2014/main" val="10002"/>
                   </a:ext>
                 </a:extLst>
               </a:tr>
@@ -32383,40 +32409,21 @@
                 <a:ea typeface="Courier New" charset="0"/>
                 <a:cs typeface="Courier New" charset="0"/>
               </a:rPr>
-              <a:t> ./</a:t>
-            </a:r>
-            <a:r>
-              <a:rPr lang="en-US" sz="2000" dirty="0" err="1">
+              <a:t> </a:t>
+            </a:r>
+            <a:r>
+              <a:rPr lang="en-US" sz="2000" dirty="0" smtClean="0">
                 <a:latin typeface="Courier New" charset="0"/>
                 <a:ea typeface="Courier New" charset="0"/>
                 <a:cs typeface="Courier New" charset="0"/>
               </a:rPr>
-              <a:t>src</a:t>
-            </a:r>
-            <a:r>
-              <a:rPr lang="en-US" sz="2000" dirty="0">
-                <a:latin typeface="Courier New" charset="0"/>
-                <a:ea typeface="Courier New" charset="0"/>
-                <a:cs typeface="Courier New" charset="0"/>
-              </a:rPr>
-              <a:t>/Applications/</a:t>
-            </a:r>
-            <a:r>
-              <a:rPr lang="en-US" sz="2000" dirty="0" err="1">
-                <a:latin typeface="Courier New" charset="0"/>
-                <a:ea typeface="Courier New" charset="0"/>
-                <a:cs typeface="Courier New" charset="0"/>
-              </a:rPr>
-              <a:t>LDAS_App</a:t>
-            </a:r>
-            <a:r>
-              <a:rPr lang="en-US" sz="2000" dirty="0">
-                <a:latin typeface="Courier New" charset="0"/>
-                <a:ea typeface="Courier New" charset="0"/>
-                <a:cs typeface="Courier New" charset="0"/>
-              </a:rPr>
-              <a:t>/doc</a:t>
-            </a:r>
+              <a:t>./doc</a:t>
+            </a:r>
+            <a:endParaRPr lang="en-US" sz="2000" dirty="0">
+              <a:latin typeface="Courier New" charset="0"/>
+              <a:ea typeface="Courier New" charset="0"/>
+              <a:cs typeface="Courier New" charset="0"/>
+            </a:endParaRPr>
           </a:p>
           <a:p>
             <a:pPr eaLnBrk="1" hangingPunct="1">
@@ -33078,7 +33085,7 @@
         <p:spPr>
           <a:xfrm>
             <a:off x="504040" y="774192"/>
-            <a:ext cx="11183919" cy="6017032"/>
+            <a:ext cx="11183919" cy="6232475"/>
           </a:xfrm>
           <a:prstGeom prst="rect">
             <a:avLst/>
@@ -33141,7 +33148,7 @@
             </a:r>
           </a:p>
           <a:p>
-            <a:pPr lvl="0" eaLnBrk="1" fontAlgn="auto" hangingPunct="1">
+            <a:pPr eaLnBrk="1" fontAlgn="auto" hangingPunct="1">
               <a:spcBef>
                 <a:spcPts val="0"/>
               </a:spcBef>
@@ -33150,7 +33157,7 @@
               </a:spcAft>
             </a:pPr>
             <a:r>
-              <a:rPr lang="en-US" sz="1400" spc="-1" dirty="0">
+              <a:rPr lang="en-US" sz="1400" spc="-1" dirty="0" smtClean="0">
                 <a:solidFill>
                   <a:srgbClr val="000000"/>
                 </a:solidFill>
@@ -33161,10 +33168,10 @@
                 </a:uFill>
                 <a:latin typeface="Courier New"/>
               </a:rPr>
-              <a:t>	/discover/</a:t>
-            </a:r>
-            <a:r>
-              <a:rPr lang="en-US" sz="1400" spc="-1" dirty="0" err="1">
+              <a:t>	</a:t>
+            </a:r>
+            <a:r>
+              <a:rPr lang="en-US" sz="1400" spc="-1" dirty="0">
                 <a:solidFill>
                   <a:srgbClr val="000000"/>
                 </a:solidFill>
@@ -33175,10 +33182,10 @@
                 </a:uFill>
                 <a:latin typeface="Courier New"/>
               </a:rPr>
-              <a:t>nobackup</a:t>
-            </a:r>
-            <a:r>
-              <a:rPr lang="en-US" sz="1400" spc="-1" dirty="0">
+              <a:t>/</a:t>
+            </a:r>
+            <a:r>
+              <a:rPr lang="en-US" sz="1400" spc="-1" dirty="0" smtClean="0">
                 <a:solidFill>
                   <a:srgbClr val="000000"/>
                 </a:solidFill>
@@ -33189,10 +33196,10 @@
                 </a:uFill>
                 <a:latin typeface="Courier New"/>
               </a:rPr>
-              <a:t>/</a:t>
-            </a:r>
-            <a:r>
-              <a:rPr lang="en-US" sz="1400" spc="-1" dirty="0" err="1">
+              <a:t>discover/</a:t>
+            </a:r>
+            <a:r>
+              <a:rPr lang="en-US" sz="1400" spc="-1" dirty="0" err="1" smtClean="0">
                 <a:solidFill>
                   <a:srgbClr val="000000"/>
                 </a:solidFill>
@@ -33203,10 +33210,10 @@
                 </a:uFill>
                 <a:latin typeface="Courier New"/>
               </a:rPr>
-              <a:t>ltakacs</a:t>
-            </a:r>
-            <a:r>
-              <a:rPr lang="en-US" sz="1400" spc="-1" dirty="0">
+              <a:t>nobackup</a:t>
+            </a:r>
+            <a:r>
+              <a:rPr lang="en-US" sz="1400" spc="-1" dirty="0" smtClean="0">
                 <a:solidFill>
                   <a:srgbClr val="000000"/>
                 </a:solidFill>
@@ -33220,7 +33227,7 @@
               <a:t>/</a:t>
             </a:r>
             <a:r>
-              <a:rPr lang="en-US" sz="1400" spc="-1" dirty="0" err="1">
+              <a:rPr lang="en-US" sz="1400" spc="-1" dirty="0" err="1" smtClean="0">
                 <a:solidFill>
                   <a:srgbClr val="000000"/>
                 </a:solidFill>
@@ -33231,10 +33238,10 @@
                 </a:uFill>
                 <a:latin typeface="Courier New"/>
               </a:rPr>
-              <a:t>bcs</a:t>
-            </a:r>
-            <a:r>
-              <a:rPr lang="en-US" sz="1400" spc="-1" dirty="0">
+              <a:t>ltakacs</a:t>
+            </a:r>
+            <a:r>
+              <a:rPr lang="en-US" sz="1400" spc="-1" dirty="0" smtClean="0">
                 <a:solidFill>
                   <a:srgbClr val="000000"/>
                 </a:solidFill>
@@ -33245,9 +33252,156 @@
                 </a:uFill>
                 <a:latin typeface="Courier New"/>
               </a:rPr>
+              <a:t>/</a:t>
+            </a:r>
+            <a:r>
+              <a:rPr lang="en-US" sz="1400" spc="-1" dirty="0" err="1" smtClean="0">
+                <a:solidFill>
+                  <a:srgbClr val="000000"/>
+                </a:solidFill>
+                <a:uFill>
+                  <a:solidFill>
+                    <a:srgbClr val="FFFFFF"/>
+                  </a:solidFill>
+                </a:uFill>
+                <a:latin typeface="Courier New"/>
+              </a:rPr>
+              <a:t>bcs</a:t>
+            </a:r>
+            <a:r>
+              <a:rPr lang="en-US" sz="1400" spc="-1" dirty="0" smtClean="0">
+                <a:solidFill>
+                  <a:srgbClr val="000000"/>
+                </a:solidFill>
+                <a:uFill>
+                  <a:solidFill>
+                    <a:srgbClr val="FFFFFF"/>
+                  </a:solidFill>
+                </a:uFill>
+                <a:latin typeface="Courier New"/>
+              </a:rPr>
+              <a:t>/Icarus-NLv3/</a:t>
+            </a:r>
+            <a:endParaRPr lang="en-US" sz="1400" spc="-1" dirty="0">
+              <a:solidFill>
+                <a:srgbClr val="000000"/>
+              </a:solidFill>
+              <a:uFill>
+                <a:solidFill>
+                  <a:srgbClr val="FFFFFF"/>
+                </a:solidFill>
+              </a:uFill>
+              <a:latin typeface="Arial"/>
+            </a:endParaRPr>
+          </a:p>
+          <a:p>
+            <a:pPr lvl="0" eaLnBrk="1" fontAlgn="auto" hangingPunct="1">
+              <a:spcBef>
+                <a:spcPts val="0"/>
+              </a:spcBef>
+              <a:spcAft>
+                <a:spcPts val="0"/>
+              </a:spcAft>
+            </a:pPr>
+            <a:r>
+              <a:rPr lang="en-US" sz="1400" spc="-1" dirty="0" smtClean="0">
+                <a:solidFill>
+                  <a:srgbClr val="000000"/>
+                </a:solidFill>
+                <a:uFill>
+                  <a:solidFill>
+                    <a:srgbClr val="FFFFFF"/>
+                  </a:solidFill>
+                </a:uFill>
+                <a:latin typeface="Courier New"/>
+              </a:rPr>
+              <a:t>	/discover/</a:t>
+            </a:r>
+            <a:r>
+              <a:rPr lang="en-US" sz="1400" spc="-1" dirty="0" err="1" smtClean="0">
+                <a:solidFill>
+                  <a:srgbClr val="000000"/>
+                </a:solidFill>
+                <a:uFill>
+                  <a:solidFill>
+                    <a:srgbClr val="FFFFFF"/>
+                  </a:solidFill>
+                </a:uFill>
+                <a:latin typeface="Courier New"/>
+              </a:rPr>
+              <a:t>nobackup</a:t>
+            </a:r>
+            <a:r>
+              <a:rPr lang="en-US" sz="1400" spc="-1" dirty="0" smtClean="0">
+                <a:solidFill>
+                  <a:srgbClr val="000000"/>
+                </a:solidFill>
+                <a:uFill>
+                  <a:solidFill>
+                    <a:srgbClr val="FFFFFF"/>
+                  </a:solidFill>
+                </a:uFill>
+                <a:latin typeface="Courier New"/>
+              </a:rPr>
+              <a:t>/</a:t>
+            </a:r>
+            <a:r>
+              <a:rPr lang="en-US" sz="1400" spc="-1" dirty="0" err="1" smtClean="0">
+                <a:solidFill>
+                  <a:srgbClr val="000000"/>
+                </a:solidFill>
+                <a:uFill>
+                  <a:solidFill>
+                    <a:srgbClr val="FFFFFF"/>
+                  </a:solidFill>
+                </a:uFill>
+                <a:latin typeface="Courier New"/>
+              </a:rPr>
+              <a:t>ltakacs</a:t>
+            </a:r>
+            <a:r>
+              <a:rPr lang="en-US" sz="1400" spc="-1" dirty="0" smtClean="0">
+                <a:solidFill>
+                  <a:srgbClr val="000000"/>
+                </a:solidFill>
+                <a:uFill>
+                  <a:solidFill>
+                    <a:srgbClr val="FFFFFF"/>
+                  </a:solidFill>
+                </a:uFill>
+                <a:latin typeface="Courier New"/>
+              </a:rPr>
+              <a:t>/</a:t>
+            </a:r>
+            <a:r>
+              <a:rPr lang="en-US" sz="1400" spc="-1" dirty="0" err="1" smtClean="0">
+                <a:solidFill>
+                  <a:srgbClr val="000000"/>
+                </a:solidFill>
+                <a:uFill>
+                  <a:solidFill>
+                    <a:srgbClr val="FFFFFF"/>
+                  </a:solidFill>
+                </a:uFill>
+                <a:latin typeface="Courier New"/>
+              </a:rPr>
+              <a:t>bcs</a:t>
+            </a:r>
+            <a:r>
+              <a:rPr lang="en-US" sz="1400" spc="-1" dirty="0" smtClean="0">
+                <a:solidFill>
+                  <a:srgbClr val="000000"/>
+                </a:solidFill>
+                <a:uFill>
+                  <a:solidFill>
+                    <a:srgbClr val="FFFFFF"/>
+                  </a:solidFill>
+                </a:uFill>
+                <a:latin typeface="Courier New"/>
+              </a:rPr>
               <a:t>/Icarus-NLv2/</a:t>
             </a:r>
-            <a:endParaRPr lang="en-US" sz="1400" spc="-1" dirty="0">
+            <a:endParaRPr lang="en-US" sz="1400" spc="-1" dirty="0" smtClean="0">
               <a:solidFill>
                 <a:srgbClr val="000000"/>
               </a:solidFill>
@@ -33987,7 +34141,7 @@
           <p:cNvPr id="4" name="TextBox 1">
             <a:extLst>
               <a:ext uri="{FF2B5EF4-FFF2-40B4-BE49-F238E27FC236}">
-                <a16:creationId xmlns:a16="http://schemas.microsoft.com/office/drawing/2014/main" id="{830FC3A9-D4AF-6C47-B748-91F5977224E9}"/>
+                <a16:creationId xmlns="" xmlns:a16="http://schemas.microsoft.com/office/drawing/2014/main" id="{830FC3A9-D4AF-6C47-B748-91F5977224E9}"/>
               </a:ext>
             </a:extLst>
           </p:cNvPr>
@@ -34232,21 +34386,21 @@
                 <a:gridCol w="5357879">
                   <a:extLst>
                     <a:ext uri="{9D8B030D-6E8A-4147-A177-3AD203B41FA5}">
-                      <a16:colId xmlns:a16="http://schemas.microsoft.com/office/drawing/2014/main" val="20000"/>
+                      <a16:colId xmlns="" xmlns:a16="http://schemas.microsoft.com/office/drawing/2014/main" val="20000"/>
                     </a:ext>
                   </a:extLst>
                 </a:gridCol>
                 <a:gridCol w="1662115">
                   <a:extLst>
                     <a:ext uri="{9D8B030D-6E8A-4147-A177-3AD203B41FA5}">
-                      <a16:colId xmlns:a16="http://schemas.microsoft.com/office/drawing/2014/main" val="20001"/>
+                      <a16:colId xmlns="" xmlns:a16="http://schemas.microsoft.com/office/drawing/2014/main" val="20001"/>
                     </a:ext>
                   </a:extLst>
                 </a:gridCol>
                 <a:gridCol w="1857660">
                   <a:extLst>
                     <a:ext uri="{9D8B030D-6E8A-4147-A177-3AD203B41FA5}">
-                      <a16:colId xmlns:a16="http://schemas.microsoft.com/office/drawing/2014/main" val="20002"/>
+                      <a16:colId xmlns="" xmlns:a16="http://schemas.microsoft.com/office/drawing/2014/main" val="20002"/>
                     </a:ext>
                   </a:extLst>
                 </a:gridCol>
@@ -34295,7 +34449,7 @@
                 </a:tc>
                 <a:extLst>
                   <a:ext uri="{0D108BD9-81ED-4DB2-BD59-A6C34878D82A}">
-                    <a16:rowId xmlns:a16="http://schemas.microsoft.com/office/drawing/2014/main" val="10000"/>
+                    <a16:rowId xmlns="" xmlns:a16="http://schemas.microsoft.com/office/drawing/2014/main" val="10000"/>
                   </a:ext>
                 </a:extLst>
               </a:tr>
@@ -34352,7 +34506,7 @@
                 </a:tc>
                 <a:extLst>
                   <a:ext uri="{0D108BD9-81ED-4DB2-BD59-A6C34878D82A}">
-                    <a16:rowId xmlns:a16="http://schemas.microsoft.com/office/drawing/2014/main" val="10001"/>
+                    <a16:rowId xmlns="" xmlns:a16="http://schemas.microsoft.com/office/drawing/2014/main" val="10001"/>
                   </a:ext>
                 </a:extLst>
               </a:tr>
@@ -34414,7 +34568,7 @@
                 </a:tc>
                 <a:extLst>
                   <a:ext uri="{0D108BD9-81ED-4DB2-BD59-A6C34878D82A}">
-                    <a16:rowId xmlns:a16="http://schemas.microsoft.com/office/drawing/2014/main" val="10002"/>
+                    <a16:rowId xmlns="" xmlns:a16="http://schemas.microsoft.com/office/drawing/2014/main" val="10002"/>
                   </a:ext>
                 </a:extLst>
               </a:tr>
@@ -34465,7 +34619,7 @@
                 </a:tc>
                 <a:extLst>
                   <a:ext uri="{0D108BD9-81ED-4DB2-BD59-A6C34878D82A}">
-                    <a16:rowId xmlns:a16="http://schemas.microsoft.com/office/drawing/2014/main" val="10003"/>
+                    <a16:rowId xmlns="" xmlns:a16="http://schemas.microsoft.com/office/drawing/2014/main" val="10003"/>
                   </a:ext>
                 </a:extLst>
               </a:tr>
@@ -34524,7 +34678,7 @@
                 </a:tc>
                 <a:extLst>
                   <a:ext uri="{0D108BD9-81ED-4DB2-BD59-A6C34878D82A}">
-                    <a16:rowId xmlns:a16="http://schemas.microsoft.com/office/drawing/2014/main" val="10004"/>
+                    <a16:rowId xmlns="" xmlns:a16="http://schemas.microsoft.com/office/drawing/2014/main" val="10004"/>
                   </a:ext>
                 </a:extLst>
               </a:tr>
@@ -34581,7 +34735,7 @@
                 </a:tc>
                 <a:extLst>
                   <a:ext uri="{0D108BD9-81ED-4DB2-BD59-A6C34878D82A}">
-                    <a16:rowId xmlns:a16="http://schemas.microsoft.com/office/drawing/2014/main" val="10005"/>
+                    <a16:rowId xmlns="" xmlns:a16="http://schemas.microsoft.com/office/drawing/2014/main" val="10005"/>
                   </a:ext>
                 </a:extLst>
               </a:tr>
@@ -34594,7 +34748,7 @@
           <p:cNvPr id="4" name="TextBox 1">
             <a:extLst>
               <a:ext uri="{FF2B5EF4-FFF2-40B4-BE49-F238E27FC236}">
-                <a16:creationId xmlns:a16="http://schemas.microsoft.com/office/drawing/2014/main" id="{AD8E181B-B8C8-6347-9D0A-E5D3F27D22A9}"/>
+                <a16:creationId xmlns="" xmlns:a16="http://schemas.microsoft.com/office/drawing/2014/main" id="{AD8E181B-B8C8-6347-9D0A-E5D3F27D22A9}"/>
               </a:ext>
             </a:extLst>
           </p:cNvPr>
@@ -34786,7 +34940,7 @@
           <p:cNvPr id="2" name="TextBox 1">
             <a:extLst>
               <a:ext uri="{FF2B5EF4-FFF2-40B4-BE49-F238E27FC236}">
-                <a16:creationId xmlns:a16="http://schemas.microsoft.com/office/drawing/2014/main" id="{08E6FEBE-4F5D-6844-9CA6-87F11DFD8BCE}"/>
+                <a16:creationId xmlns="" xmlns:a16="http://schemas.microsoft.com/office/drawing/2014/main" id="{08E6FEBE-4F5D-6844-9CA6-87F11DFD8BCE}"/>
               </a:ext>
             </a:extLst>
           </p:cNvPr>
@@ -34857,7 +35011,7 @@
           <p:nvPr>
             <p:extLst>
               <p:ext uri="{D42A27DB-BD31-4B8C-83A1-F6EECF244321}">
-                <p14:modId xmlns:p14="http://schemas.microsoft.com/office/powerpoint/2010/main" val="3805991403"/>
+                <p14:modId xmlns:p14="http://schemas.microsoft.com/office/powerpoint/2010/main" val="2686219720"/>
               </p:ext>
             </p:extLst>
           </p:nvPr>
@@ -34876,21 +35030,21 @@
                 <a:gridCol w="1917700">
                   <a:extLst>
                     <a:ext uri="{9D8B030D-6E8A-4147-A177-3AD203B41FA5}">
-                      <a16:colId xmlns:a16="http://schemas.microsoft.com/office/drawing/2014/main" val="20000"/>
+                      <a16:colId xmlns="" xmlns:a16="http://schemas.microsoft.com/office/drawing/2014/main" val="20000"/>
                     </a:ext>
                   </a:extLst>
                 </a:gridCol>
                 <a:gridCol w="4382517">
                   <a:extLst>
                     <a:ext uri="{9D8B030D-6E8A-4147-A177-3AD203B41FA5}">
-                      <a16:colId xmlns:a16="http://schemas.microsoft.com/office/drawing/2014/main" val="20001"/>
+                      <a16:colId xmlns="" xmlns:a16="http://schemas.microsoft.com/office/drawing/2014/main" val="20001"/>
                     </a:ext>
                   </a:extLst>
                 </a:gridCol>
                 <a:gridCol w="5358383">
                   <a:extLst>
                     <a:ext uri="{9D8B030D-6E8A-4147-A177-3AD203B41FA5}">
-                      <a16:colId xmlns:a16="http://schemas.microsoft.com/office/drawing/2014/main" val="20002"/>
+                      <a16:colId xmlns="" xmlns:a16="http://schemas.microsoft.com/office/drawing/2014/main" val="20002"/>
                     </a:ext>
                   </a:extLst>
                 </a:gridCol>
@@ -34931,8 +35085,12 @@
                     <a:p>
                       <a:pPr algn="ctr"/>
                       <a:r>
+                        <a:rPr lang="en-US" sz="1600" dirty="0" smtClean="0"/>
+                        <a:t>Icarus-NLv3 </a:t>
+                      </a:r>
+                      <a:r>
                         <a:rPr lang="en-US" sz="1600" dirty="0"/>
-                        <a:t>Icarus-NLv2 (“New Land”)</a:t>
+                        <a:t>(“New Land”)</a:t>
                       </a:r>
                     </a:p>
                   </a:txBody>
@@ -34940,7 +35098,7 @@
                 </a:tc>
                 <a:extLst>
                   <a:ext uri="{0D108BD9-81ED-4DB2-BD59-A6C34878D82A}">
-                    <a16:rowId xmlns:a16="http://schemas.microsoft.com/office/drawing/2014/main" val="10000"/>
+                    <a16:rowId xmlns="" xmlns:a16="http://schemas.microsoft.com/office/drawing/2014/main" val="10000"/>
                   </a:ext>
                 </a:extLst>
               </a:tr>
@@ -35001,7 +35159,7 @@
                 </a:tc>
                 <a:extLst>
                   <a:ext uri="{0D108BD9-81ED-4DB2-BD59-A6C34878D82A}">
-                    <a16:rowId xmlns:a16="http://schemas.microsoft.com/office/drawing/2014/main" val="10001"/>
+                    <a16:rowId xmlns="" xmlns:a16="http://schemas.microsoft.com/office/drawing/2014/main" val="10001"/>
                   </a:ext>
                 </a:extLst>
               </a:tr>
@@ -35051,7 +35209,7 @@
                 </a:tc>
                 <a:extLst>
                   <a:ext uri="{0D108BD9-81ED-4DB2-BD59-A6C34878D82A}">
-                    <a16:rowId xmlns:a16="http://schemas.microsoft.com/office/drawing/2014/main" val="10002"/>
+                    <a16:rowId xmlns="" xmlns:a16="http://schemas.microsoft.com/office/drawing/2014/main" val="10002"/>
                   </a:ext>
                 </a:extLst>
               </a:tr>
@@ -35133,7 +35291,7 @@
                 </a:tc>
                 <a:extLst>
                   <a:ext uri="{0D108BD9-81ED-4DB2-BD59-A6C34878D82A}">
-                    <a16:rowId xmlns:a16="http://schemas.microsoft.com/office/drawing/2014/main" val="10003"/>
+                    <a16:rowId xmlns="" xmlns:a16="http://schemas.microsoft.com/office/drawing/2014/main" val="10003"/>
                   </a:ext>
                 </a:extLst>
               </a:tr>
@@ -35206,7 +35364,7 @@
                 </a:tc>
                 <a:extLst>
                   <a:ext uri="{0D108BD9-81ED-4DB2-BD59-A6C34878D82A}">
-                    <a16:rowId xmlns:a16="http://schemas.microsoft.com/office/drawing/2014/main" val="10012"/>
+                    <a16:rowId xmlns="" xmlns:a16="http://schemas.microsoft.com/office/drawing/2014/main" val="10012"/>
                   </a:ext>
                 </a:extLst>
               </a:tr>
@@ -35280,7 +35438,7 @@
                 </a:tc>
                 <a:extLst>
                   <a:ext uri="{0D108BD9-81ED-4DB2-BD59-A6C34878D82A}">
-                    <a16:rowId xmlns:a16="http://schemas.microsoft.com/office/drawing/2014/main" val="10013"/>
+                    <a16:rowId xmlns="" xmlns:a16="http://schemas.microsoft.com/office/drawing/2014/main" val="10013"/>
                   </a:ext>
                 </a:extLst>
               </a:tr>
@@ -35349,7 +35507,7 @@
                 </a:tc>
                 <a:extLst>
                   <a:ext uri="{0D108BD9-81ED-4DB2-BD59-A6C34878D82A}">
-                    <a16:rowId xmlns:a16="http://schemas.microsoft.com/office/drawing/2014/main" val="10004"/>
+                    <a16:rowId xmlns="" xmlns:a16="http://schemas.microsoft.com/office/drawing/2014/main" val="10004"/>
                   </a:ext>
                 </a:extLst>
               </a:tr>
@@ -35455,7 +35613,7 @@
                 </a:tc>
                 <a:extLst>
                   <a:ext uri="{0D108BD9-81ED-4DB2-BD59-A6C34878D82A}">
-                    <a16:rowId xmlns:a16="http://schemas.microsoft.com/office/drawing/2014/main" val="10005"/>
+                    <a16:rowId xmlns="" xmlns:a16="http://schemas.microsoft.com/office/drawing/2014/main" val="10005"/>
                   </a:ext>
                 </a:extLst>
               </a:tr>
@@ -35496,12 +35654,12 @@
                     <a:p>
                       <a:pPr algn="l"/>
                       <a:r>
-                        <a:rPr lang="en-US" sz="1550" baseline="0" dirty="0">
-                          <a:solidFill>
-                            <a:srgbClr val="FF0000"/>
-                          </a:solidFill>
-                        </a:rPr>
-                        <a:t>JPL (30-arcsec)</a:t>
+                        <a:rPr lang="en-US" sz="1550" dirty="0" smtClean="0"/>
+                        <a:t>Look-up</a:t>
+                      </a:r>
+                      <a:r>
+                        <a:rPr lang="en-US" sz="1550" baseline="0" dirty="0" smtClean="0"/>
+                        <a:t> table and simple tree SAI  (reverted JPL heights in NLv2)</a:t>
                       </a:r>
                       <a:endParaRPr lang="en-US" sz="1550" dirty="0"/>
                     </a:p>
@@ -35510,7 +35668,7 @@
                 </a:tc>
                 <a:extLst>
                   <a:ext uri="{0D108BD9-81ED-4DB2-BD59-A6C34878D82A}">
-                    <a16:rowId xmlns:a16="http://schemas.microsoft.com/office/drawing/2014/main" val="10006"/>
+                    <a16:rowId xmlns="" xmlns:a16="http://schemas.microsoft.com/office/drawing/2014/main" val="10006"/>
                   </a:ext>
                 </a:extLst>
               </a:tr>
@@ -35596,7 +35754,7 @@
                 </a:tc>
                 <a:extLst>
                   <a:ext uri="{0D108BD9-81ED-4DB2-BD59-A6C34878D82A}">
-                    <a16:rowId xmlns:a16="http://schemas.microsoft.com/office/drawing/2014/main" val="10007"/>
+                    <a16:rowId xmlns="" xmlns:a16="http://schemas.microsoft.com/office/drawing/2014/main" val="10007"/>
                   </a:ext>
                 </a:extLst>
               </a:tr>
@@ -35661,7 +35819,7 @@
                 </a:tc>
                 <a:extLst>
                   <a:ext uri="{0D108BD9-81ED-4DB2-BD59-A6C34878D82A}">
-                    <a16:rowId xmlns:a16="http://schemas.microsoft.com/office/drawing/2014/main" val="10008"/>
+                    <a16:rowId xmlns="" xmlns:a16="http://schemas.microsoft.com/office/drawing/2014/main" val="10008"/>
                   </a:ext>
                 </a:extLst>
               </a:tr>
@@ -35791,7 +35949,7 @@
                 </a:tc>
                 <a:extLst>
                   <a:ext uri="{0D108BD9-81ED-4DB2-BD59-A6C34878D82A}">
-                    <a16:rowId xmlns:a16="http://schemas.microsoft.com/office/drawing/2014/main" val="10009"/>
+                    <a16:rowId xmlns="" xmlns:a16="http://schemas.microsoft.com/office/drawing/2014/main" val="10009"/>
                   </a:ext>
                 </a:extLst>
               </a:tr>
@@ -35922,7 +36080,7 @@
                 </a:tc>
                 <a:extLst>
                   <a:ext uri="{0D108BD9-81ED-4DB2-BD59-A6C34878D82A}">
-                    <a16:rowId xmlns:a16="http://schemas.microsoft.com/office/drawing/2014/main" val="10010"/>
+                    <a16:rowId xmlns="" xmlns:a16="http://schemas.microsoft.com/office/drawing/2014/main" val="10010"/>
                   </a:ext>
                 </a:extLst>
               </a:tr>
@@ -35973,7 +36131,7 @@
                 </a:tc>
                 <a:extLst>
                   <a:ext uri="{0D108BD9-81ED-4DB2-BD59-A6C34878D82A}">
-                    <a16:rowId xmlns:a16="http://schemas.microsoft.com/office/drawing/2014/main" val="10011"/>
+                    <a16:rowId xmlns="" xmlns:a16="http://schemas.microsoft.com/office/drawing/2014/main" val="10011"/>
                   </a:ext>
                 </a:extLst>
               </a:tr>
@@ -35986,7 +36144,7 @@
           <p:cNvPr id="4" name="TextBox 1">
             <a:extLst>
               <a:ext uri="{FF2B5EF4-FFF2-40B4-BE49-F238E27FC236}">
-                <a16:creationId xmlns:a16="http://schemas.microsoft.com/office/drawing/2014/main" id="{3A444153-FF5A-2C4B-A9F2-915E8F72EEBC}"/>
+                <a16:creationId xmlns="" xmlns:a16="http://schemas.microsoft.com/office/drawing/2014/main" id="{3A444153-FF5A-2C4B-A9F2-915E8F72EEBC}"/>
               </a:ext>
             </a:extLst>
           </p:cNvPr>
@@ -36212,7 +36370,7 @@
           <p:nvPr>
             <p:extLst>
               <p:ext uri="{D42A27DB-BD31-4B8C-83A1-F6EECF244321}">
-                <p14:modId xmlns:p14="http://schemas.microsoft.com/office/powerpoint/2010/main" val="3602681501"/>
+                <p14:modId xmlns:p14="http://schemas.microsoft.com/office/powerpoint/2010/main" val="2747365152"/>
               </p:ext>
             </p:extLst>
           </p:nvPr>
@@ -36231,28 +36389,28 @@
                 <a:gridCol w="3319761">
                   <a:extLst>
                     <a:ext uri="{9D8B030D-6E8A-4147-A177-3AD203B41FA5}">
-                      <a16:colId xmlns:a16="http://schemas.microsoft.com/office/drawing/2014/main" val="20000"/>
+                      <a16:colId xmlns="" xmlns:a16="http://schemas.microsoft.com/office/drawing/2014/main" val="20000"/>
                     </a:ext>
                   </a:extLst>
                 </a:gridCol>
                 <a:gridCol w="1930311">
                   <a:extLst>
                     <a:ext uri="{9D8B030D-6E8A-4147-A177-3AD203B41FA5}">
-                      <a16:colId xmlns:a16="http://schemas.microsoft.com/office/drawing/2014/main" val="20001"/>
+                      <a16:colId xmlns="" xmlns:a16="http://schemas.microsoft.com/office/drawing/2014/main" val="20001"/>
                     </a:ext>
                   </a:extLst>
                 </a:gridCol>
                 <a:gridCol w="3310437">
                   <a:extLst>
                     <a:ext uri="{9D8B030D-6E8A-4147-A177-3AD203B41FA5}">
-                      <a16:colId xmlns:a16="http://schemas.microsoft.com/office/drawing/2014/main" val="20002"/>
+                      <a16:colId xmlns="" xmlns:a16="http://schemas.microsoft.com/office/drawing/2014/main" val="20002"/>
                     </a:ext>
                   </a:extLst>
                 </a:gridCol>
                 <a:gridCol w="3310437">
                   <a:extLst>
                     <a:ext uri="{9D8B030D-6E8A-4147-A177-3AD203B41FA5}">
-                      <a16:colId xmlns:a16="http://schemas.microsoft.com/office/drawing/2014/main" val="2005585204"/>
+                      <a16:colId xmlns="" xmlns:a16="http://schemas.microsoft.com/office/drawing/2014/main" val="2005585204"/>
                     </a:ext>
                   </a:extLst>
                 </a:gridCol>
@@ -36322,23 +36480,32 @@
                     <a:p>
                       <a:pPr algn="ctr"/>
                       <a:r>
-                        <a:rPr lang="en-US" sz="1600" dirty="0"/>
-                        <a:t>GEOSldas_m4-17_7 (and *17_6)</a:t>
+                        <a:rPr lang="en-US" sz="1600" dirty="0" err="1" smtClean="0"/>
+                        <a:t>GEOSldas</a:t>
                       </a:r>
-                    </a:p>
-                    <a:p>
-                      <a:pPr algn="ctr"/>
                       <a:r>
-                        <a:rPr lang="en-US" sz="1600" dirty="0"/>
-                        <a:t>(NRv7.2)</a:t>
+                        <a:rPr lang="en-US" sz="1600" dirty="0" smtClean="0"/>
+                        <a:t> </a:t>
                       </a:r>
+                      <a:r>
+                        <a:rPr lang="en-US" sz="1600" dirty="0" smtClean="0">
+                          <a:latin typeface="+mn-lt"/>
+                          <a:cs typeface="+mn-cs"/>
+                        </a:rPr>
+                        <a:t>v17.8.0 (and </a:t>
+                      </a:r>
+                      <a:r>
+                        <a:rPr lang="en-US" sz="1600" dirty="0" smtClean="0"/>
+                        <a:t>GEOSldas_m4-17_7)</a:t>
+                      </a:r>
+                      <a:endParaRPr lang="en-US" sz="1600" dirty="0"/>
                     </a:p>
                   </a:txBody>
                   <a:tcPr marT="45727" marB="45727"/>
                 </a:tc>
                 <a:extLst>
                   <a:ext uri="{0D108BD9-81ED-4DB2-BD59-A6C34878D82A}">
-                    <a16:rowId xmlns:a16="http://schemas.microsoft.com/office/drawing/2014/main" val="10000"/>
+                    <a16:rowId xmlns="" xmlns:a16="http://schemas.microsoft.com/office/drawing/2014/main" val="10000"/>
                   </a:ext>
                 </a:extLst>
               </a:tr>
@@ -36409,7 +36576,7 @@
                 </a:tc>
                 <a:extLst>
                   <a:ext uri="{0D108BD9-81ED-4DB2-BD59-A6C34878D82A}">
-                    <a16:rowId xmlns:a16="http://schemas.microsoft.com/office/drawing/2014/main" val="10001"/>
+                    <a16:rowId xmlns="" xmlns:a16="http://schemas.microsoft.com/office/drawing/2014/main" val="10001"/>
                   </a:ext>
                 </a:extLst>
               </a:tr>
@@ -36480,7 +36647,7 @@
                 </a:tc>
                 <a:extLst>
                   <a:ext uri="{0D108BD9-81ED-4DB2-BD59-A6C34878D82A}">
-                    <a16:rowId xmlns:a16="http://schemas.microsoft.com/office/drawing/2014/main" val="10002"/>
+                    <a16:rowId xmlns="" xmlns:a16="http://schemas.microsoft.com/office/drawing/2014/main" val="10002"/>
                   </a:ext>
                 </a:extLst>
               </a:tr>
@@ -36547,7 +36714,7 @@
                 </a:tc>
                 <a:extLst>
                   <a:ext uri="{0D108BD9-81ED-4DB2-BD59-A6C34878D82A}">
-                    <a16:rowId xmlns:a16="http://schemas.microsoft.com/office/drawing/2014/main" val="10003"/>
+                    <a16:rowId xmlns="" xmlns:a16="http://schemas.microsoft.com/office/drawing/2014/main" val="10003"/>
                   </a:ext>
                 </a:extLst>
               </a:tr>
@@ -36639,7 +36806,7 @@
                 </a:tc>
                 <a:extLst>
                   <a:ext uri="{0D108BD9-81ED-4DB2-BD59-A6C34878D82A}">
-                    <a16:rowId xmlns:a16="http://schemas.microsoft.com/office/drawing/2014/main" val="10004"/>
+                    <a16:rowId xmlns="" xmlns:a16="http://schemas.microsoft.com/office/drawing/2014/main" val="10004"/>
                   </a:ext>
                 </a:extLst>
               </a:tr>
@@ -36758,7 +36925,7 @@
                 </a:tc>
                 <a:extLst>
                   <a:ext uri="{0D108BD9-81ED-4DB2-BD59-A6C34878D82A}">
-                    <a16:rowId xmlns:a16="http://schemas.microsoft.com/office/drawing/2014/main" val="10005"/>
+                    <a16:rowId xmlns="" xmlns:a16="http://schemas.microsoft.com/office/drawing/2014/main" val="10005"/>
                   </a:ext>
                 </a:extLst>
               </a:tr>
@@ -36850,7 +37017,7 @@
                 </a:tc>
                 <a:extLst>
                   <a:ext uri="{0D108BD9-81ED-4DB2-BD59-A6C34878D82A}">
-                    <a16:rowId xmlns:a16="http://schemas.microsoft.com/office/drawing/2014/main" val="10006"/>
+                    <a16:rowId xmlns="" xmlns:a16="http://schemas.microsoft.com/office/drawing/2014/main" val="10006"/>
                   </a:ext>
                 </a:extLst>
               </a:tr>
@@ -36942,7 +37109,7 @@
                 </a:tc>
                 <a:extLst>
                   <a:ext uri="{0D108BD9-81ED-4DB2-BD59-A6C34878D82A}">
-                    <a16:rowId xmlns:a16="http://schemas.microsoft.com/office/drawing/2014/main" val="10007"/>
+                    <a16:rowId xmlns="" xmlns:a16="http://schemas.microsoft.com/office/drawing/2014/main" val="10007"/>
                   </a:ext>
                 </a:extLst>
               </a:tr>
@@ -37099,7 +37266,7 @@
                 </a:tc>
                 <a:extLst>
                   <a:ext uri="{0D108BD9-81ED-4DB2-BD59-A6C34878D82A}">
-                    <a16:rowId xmlns:a16="http://schemas.microsoft.com/office/drawing/2014/main" val="10008"/>
+                    <a16:rowId xmlns="" xmlns:a16="http://schemas.microsoft.com/office/drawing/2014/main" val="10008"/>
                   </a:ext>
                 </a:extLst>
               </a:tr>
@@ -37236,7 +37403,7 @@
                 </a:tc>
                 <a:extLst>
                   <a:ext uri="{0D108BD9-81ED-4DB2-BD59-A6C34878D82A}">
-                    <a16:rowId xmlns:a16="http://schemas.microsoft.com/office/drawing/2014/main" val="10009"/>
+                    <a16:rowId xmlns="" xmlns:a16="http://schemas.microsoft.com/office/drawing/2014/main" val="10009"/>
                   </a:ext>
                 </a:extLst>
               </a:tr>
@@ -37405,7 +37572,7 @@
                 </a:tc>
                 <a:extLst>
                   <a:ext uri="{0D108BD9-81ED-4DB2-BD59-A6C34878D82A}">
-                    <a16:rowId xmlns:a16="http://schemas.microsoft.com/office/drawing/2014/main" val="10010"/>
+                    <a16:rowId xmlns="" xmlns:a16="http://schemas.microsoft.com/office/drawing/2014/main" val="10010"/>
                   </a:ext>
                 </a:extLst>
               </a:tr>
@@ -37573,7 +37740,7 @@
                 </a:tc>
                 <a:extLst>
                   <a:ext uri="{0D108BD9-81ED-4DB2-BD59-A6C34878D82A}">
-                    <a16:rowId xmlns:a16="http://schemas.microsoft.com/office/drawing/2014/main" val="10011"/>
+                    <a16:rowId xmlns="" xmlns:a16="http://schemas.microsoft.com/office/drawing/2014/main" val="10011"/>
                   </a:ext>
                 </a:extLst>
               </a:tr>
@@ -37729,7 +37896,7 @@
                 </a:tc>
                 <a:extLst>
                   <a:ext uri="{0D108BD9-81ED-4DB2-BD59-A6C34878D82A}">
-                    <a16:rowId xmlns:a16="http://schemas.microsoft.com/office/drawing/2014/main" val="10012"/>
+                    <a16:rowId xmlns="" xmlns:a16="http://schemas.microsoft.com/office/drawing/2014/main" val="10012"/>
                   </a:ext>
                 </a:extLst>
               </a:tr>
@@ -37742,7 +37909,7 @@
           <p:cNvPr id="5" name="TextBox 1">
             <a:extLst>
               <a:ext uri="{FF2B5EF4-FFF2-40B4-BE49-F238E27FC236}">
-                <a16:creationId xmlns:a16="http://schemas.microsoft.com/office/drawing/2014/main" id="{A4842E2F-C433-B142-AAEF-9B348933B604}"/>
+                <a16:creationId xmlns="" xmlns:a16="http://schemas.microsoft.com/office/drawing/2014/main" id="{A4842E2F-C433-B142-AAEF-9B348933B604}"/>
               </a:ext>
             </a:extLst>
           </p:cNvPr>
@@ -37963,14 +38130,14 @@
           <p:nvPr>
             <p:extLst>
               <p:ext uri="{D42A27DB-BD31-4B8C-83A1-F6EECF244321}">
-                <p14:modId xmlns:p14="http://schemas.microsoft.com/office/powerpoint/2010/main" val="1323667902"/>
+                <p14:modId xmlns:p14="http://schemas.microsoft.com/office/powerpoint/2010/main" val="601545969"/>
               </p:ext>
             </p:extLst>
           </p:nvPr>
         </p:nvGraphicFramePr>
         <p:xfrm>
-          <a:off x="133350" y="480131"/>
-          <a:ext cx="11925300" cy="6350993"/>
+          <a:off x="133350" y="359811"/>
+          <a:ext cx="11925300" cy="6594833"/>
         </p:xfrm>
         <a:graphic>
           <a:graphicData uri="http://schemas.openxmlformats.org/drawingml/2006/table">
@@ -37982,21 +38149,21 @@
                 <a:gridCol w="2575158">
                   <a:extLst>
                     <a:ext uri="{9D8B030D-6E8A-4147-A177-3AD203B41FA5}">
-                      <a16:colId xmlns:a16="http://schemas.microsoft.com/office/drawing/2014/main" val="20000"/>
+                      <a16:colId xmlns="" xmlns:a16="http://schemas.microsoft.com/office/drawing/2014/main" val="20000"/>
                     </a:ext>
                   </a:extLst>
                 </a:gridCol>
                 <a:gridCol w="4626864">
                   <a:extLst>
                     <a:ext uri="{9D8B030D-6E8A-4147-A177-3AD203B41FA5}">
-                      <a16:colId xmlns:a16="http://schemas.microsoft.com/office/drawing/2014/main" val="20001"/>
+                      <a16:colId xmlns="" xmlns:a16="http://schemas.microsoft.com/office/drawing/2014/main" val="20001"/>
                     </a:ext>
                   </a:extLst>
                 </a:gridCol>
                 <a:gridCol w="4723278">
                   <a:extLst>
                     <a:ext uri="{9D8B030D-6E8A-4147-A177-3AD203B41FA5}">
-                      <a16:colId xmlns:a16="http://schemas.microsoft.com/office/drawing/2014/main" val="20002"/>
+                      <a16:colId xmlns="" xmlns:a16="http://schemas.microsoft.com/office/drawing/2014/main" val="20002"/>
                     </a:ext>
                   </a:extLst>
                 </a:gridCol>
@@ -38044,8 +38211,12 @@
                     <a:p>
                       <a:pPr algn="ctr"/>
                       <a:r>
+                        <a:rPr lang="en-US" sz="1600" dirty="0" smtClean="0"/>
+                        <a:t>GEOSldas_m4-17_7 </a:t>
+                      </a:r>
+                      <a:r>
                         <a:rPr lang="en-US" sz="1600" dirty="0"/>
-                        <a:t>GEOSldas_m4-17_7 (and *17_6 and *17_0)      </a:t>
+                        <a:t>(and *17_6 and *17_0)      </a:t>
                       </a:r>
                     </a:p>
                     <a:p>
@@ -38068,7 +38239,7 @@
                 </a:tc>
                 <a:extLst>
                   <a:ext uri="{0D108BD9-81ED-4DB2-BD59-A6C34878D82A}">
-                    <a16:rowId xmlns:a16="http://schemas.microsoft.com/office/drawing/2014/main" val="10000"/>
+                    <a16:rowId xmlns="" xmlns:a16="http://schemas.microsoft.com/office/drawing/2014/main" val="10000"/>
                   </a:ext>
                 </a:extLst>
               </a:tr>
@@ -38148,7 +38319,7 @@
                 </a:tc>
                 <a:extLst>
                   <a:ext uri="{0D108BD9-81ED-4DB2-BD59-A6C34878D82A}">
-                    <a16:rowId xmlns:a16="http://schemas.microsoft.com/office/drawing/2014/main" val="10001"/>
+                    <a16:rowId xmlns="" xmlns:a16="http://schemas.microsoft.com/office/drawing/2014/main" val="10001"/>
                   </a:ext>
                 </a:extLst>
               </a:tr>
@@ -38514,25 +38685,66 @@
                     </a:p>
                     <a:p>
                       <a:pPr algn="l"/>
-                      <a:endParaRPr lang="en-US" sz="1600" baseline="0" dirty="0">
-                        <a:solidFill>
-                          <a:srgbClr val="FF0000"/>
-                        </a:solidFill>
+                      <a:endParaRPr lang="en-US" sz="1600" dirty="0" smtClean="0">
+                        <a:latin typeface="+mn-lt"/>
+                        <a:cs typeface="+mn-cs"/>
                       </a:endParaRPr>
                     </a:p>
                     <a:p>
                       <a:pPr algn="l"/>
                       <a:r>
-                        <a:rPr lang="en-US" sz="1600" baseline="0" dirty="0">
+                        <a:rPr lang="en-US" sz="1600" b="1" dirty="0" smtClean="0">
                           <a:solidFill>
-                            <a:srgbClr val="FF0000"/>
+                            <a:srgbClr val="C00000"/>
                           </a:solidFill>
+                          <a:latin typeface="+mn-lt"/>
+                          <a:cs typeface="+mn-cs"/>
                         </a:rPr>
-                        <a:t>Unintentionally, the default in GEOSldas_m4-17_6 and *17_0 was Z0_FORMULATION=2.</a:t>
+                        <a:t>**</a:t>
                       </a:r>
-                      <a:endParaRPr lang="en-US" sz="1600" dirty="0">
+                      <a:r>
+                        <a:rPr lang="en-US" sz="1600" b="1" dirty="0" err="1" smtClean="0">
+                          <a:solidFill>
+                            <a:srgbClr val="C00000"/>
+                          </a:solidFill>
+                          <a:latin typeface="+mn-lt"/>
+                          <a:cs typeface="+mn-cs"/>
+                        </a:rPr>
+                        <a:t>GEOSldas</a:t>
+                      </a:r>
+                      <a:r>
+                        <a:rPr lang="en-US" sz="1600" b="1" baseline="0" dirty="0" smtClean="0">
+                          <a:solidFill>
+                            <a:srgbClr val="C00000"/>
+                          </a:solidFill>
+                          <a:latin typeface="+mn-lt"/>
+                          <a:cs typeface="+mn-cs"/>
+                        </a:rPr>
+                        <a:t> </a:t>
+                      </a:r>
+                      <a:r>
+                        <a:rPr lang="en-US" sz="1600" b="1" dirty="0" smtClean="0">
+                          <a:solidFill>
+                            <a:srgbClr val="C00000"/>
+                          </a:solidFill>
+                          <a:latin typeface="+mn-lt"/>
+                          <a:cs typeface="+mn-cs"/>
+                        </a:rPr>
+                        <a:t>v17.8.0 reverts</a:t>
+                      </a:r>
+                      <a:r>
+                        <a:rPr lang="en-US" sz="1600" b="1" baseline="0" dirty="0" smtClean="0">
+                          <a:solidFill>
+                            <a:srgbClr val="C00000"/>
+                          </a:solidFill>
+                          <a:latin typeface="+mn-lt"/>
+                          <a:cs typeface="+mn-cs"/>
+                        </a:rPr>
+                        <a:t> to modified Z0_FORM=2, adding simple tree SAI, mean to be used with Z2 from lookup table**</a:t>
+                      </a:r>
+                      <a:endParaRPr lang="en-US" sz="1600" b="1" baseline="0" dirty="0">
                         <a:solidFill>
-                          <a:srgbClr val="FF0000"/>
+                          <a:srgbClr val="C00000"/>
                         </a:solidFill>
                       </a:endParaRPr>
                     </a:p>
@@ -38541,7 +38753,7 @@
                 </a:tc>
                 <a:extLst>
                   <a:ext uri="{0D108BD9-81ED-4DB2-BD59-A6C34878D82A}">
-                    <a16:rowId xmlns:a16="http://schemas.microsoft.com/office/drawing/2014/main" val="10002"/>
+                    <a16:rowId xmlns="" xmlns:a16="http://schemas.microsoft.com/office/drawing/2014/main" val="10002"/>
                   </a:ext>
                 </a:extLst>
               </a:tr>
@@ -38651,7 +38863,7 @@
                 </a:tc>
                 <a:extLst>
                   <a:ext uri="{0D108BD9-81ED-4DB2-BD59-A6C34878D82A}">
-                    <a16:rowId xmlns:a16="http://schemas.microsoft.com/office/drawing/2014/main" val="10003"/>
+                    <a16:rowId xmlns="" xmlns:a16="http://schemas.microsoft.com/office/drawing/2014/main" val="10003"/>
                   </a:ext>
                 </a:extLst>
               </a:tr>
@@ -38741,7 +38953,7 @@
                 </a:tc>
                 <a:extLst>
                   <a:ext uri="{0D108BD9-81ED-4DB2-BD59-A6C34878D82A}">
-                    <a16:rowId xmlns:a16="http://schemas.microsoft.com/office/drawing/2014/main" val="10004"/>
+                    <a16:rowId xmlns="" xmlns:a16="http://schemas.microsoft.com/office/drawing/2014/main" val="10004"/>
                   </a:ext>
                 </a:extLst>
               </a:tr>
@@ -38874,7 +39086,7 @@
                 </a:tc>
                 <a:extLst>
                   <a:ext uri="{0D108BD9-81ED-4DB2-BD59-A6C34878D82A}">
-                    <a16:rowId xmlns:a16="http://schemas.microsoft.com/office/drawing/2014/main" val="10005"/>
+                    <a16:rowId xmlns="" xmlns:a16="http://schemas.microsoft.com/office/drawing/2014/main" val="10005"/>
                   </a:ext>
                 </a:extLst>
               </a:tr>
@@ -38995,7 +39207,7 @@
                 </a:tc>
                 <a:extLst>
                   <a:ext uri="{0D108BD9-81ED-4DB2-BD59-A6C34878D82A}">
-                    <a16:rowId xmlns:a16="http://schemas.microsoft.com/office/drawing/2014/main" val="10006"/>
+                    <a16:rowId xmlns="" xmlns:a16="http://schemas.microsoft.com/office/drawing/2014/main" val="10006"/>
                   </a:ext>
                 </a:extLst>
               </a:tr>
@@ -39008,7 +39220,7 @@
           <p:cNvPr id="5" name="TextBox 1">
             <a:extLst>
               <a:ext uri="{FF2B5EF4-FFF2-40B4-BE49-F238E27FC236}">
-                <a16:creationId xmlns:a16="http://schemas.microsoft.com/office/drawing/2014/main" id="{221A0B40-54C6-624F-A3D0-7231E4728615}"/>
+                <a16:creationId xmlns="" xmlns:a16="http://schemas.microsoft.com/office/drawing/2014/main" id="{221A0B40-54C6-624F-A3D0-7231E4728615}"/>
               </a:ext>
             </a:extLst>
           </p:cNvPr>
@@ -44133,49 +44345,63 @@
                 <a:latin typeface="Courier New" panose="02070309020205020404" pitchFamily="49" charset="0"/>
                 <a:cs typeface="Courier New" panose="02070309020205020404" pitchFamily="49" charset="0"/>
               </a:rPr>
-              <a:t>/discover/</a:t>
-            </a:r>
-            <a:r>
-              <a:rPr lang="en-US" altLang="en-US" sz="1200" dirty="0" err="1">
+              <a:t>/</a:t>
+            </a:r>
+            <a:r>
+              <a:rPr lang="en-US" altLang="en-US" sz="1200" dirty="0" smtClean="0">
+                <a:latin typeface="Courier New" panose="02070309020205020404" pitchFamily="49" charset="0"/>
+                <a:cs typeface="Courier New" panose="02070309020205020404" pitchFamily="49" charset="0"/>
+              </a:rPr>
+              <a:t>discover/</a:t>
+            </a:r>
+            <a:r>
+              <a:rPr lang="en-US" altLang="en-US" sz="1200" dirty="0" err="1" smtClean="0">
                 <a:latin typeface="Courier New" panose="02070309020205020404" pitchFamily="49" charset="0"/>
                 <a:cs typeface="Courier New" panose="02070309020205020404" pitchFamily="49" charset="0"/>
               </a:rPr>
               <a:t>nobackup</a:t>
             </a:r>
             <a:r>
+              <a:rPr lang="en-US" altLang="en-US" sz="1200" dirty="0" smtClean="0">
+                <a:latin typeface="Courier New" panose="02070309020205020404" pitchFamily="49" charset="0"/>
+                <a:cs typeface="Courier New" panose="02070309020205020404" pitchFamily="49" charset="0"/>
+              </a:rPr>
+              <a:t>/</a:t>
+            </a:r>
+            <a:r>
+              <a:rPr lang="en-US" altLang="en-US" sz="1200" dirty="0" err="1" smtClean="0">
+                <a:latin typeface="Courier New" panose="02070309020205020404" pitchFamily="49" charset="0"/>
+                <a:cs typeface="Courier New" panose="02070309020205020404" pitchFamily="49" charset="0"/>
+              </a:rPr>
+              <a:t>ltakacs</a:t>
+            </a:r>
+            <a:r>
+              <a:rPr lang="en-US" altLang="en-US" sz="1200" dirty="0" smtClean="0">
+                <a:latin typeface="Courier New" panose="02070309020205020404" pitchFamily="49" charset="0"/>
+                <a:cs typeface="Courier New" panose="02070309020205020404" pitchFamily="49" charset="0"/>
+              </a:rPr>
+              <a:t>/</a:t>
+            </a:r>
+            <a:r>
+              <a:rPr lang="en-US" altLang="en-US" sz="1200" dirty="0" err="1" smtClean="0">
+                <a:latin typeface="Courier New" panose="02070309020205020404" pitchFamily="49" charset="0"/>
+                <a:cs typeface="Courier New" panose="02070309020205020404" pitchFamily="49" charset="0"/>
+              </a:rPr>
+              <a:t>bcs</a:t>
+            </a:r>
+            <a:r>
+              <a:rPr lang="en-US" altLang="en-US" sz="1200" dirty="0" smtClean="0">
+                <a:latin typeface="Courier New" panose="02070309020205020404" pitchFamily="49" charset="0"/>
+                <a:cs typeface="Courier New" panose="02070309020205020404" pitchFamily="49" charset="0"/>
+              </a:rPr>
+              <a:t>/Icarus-NLv3/Icarus-NLv3_EASE/SMAP_EASEv2_M36</a:t>
+            </a:r>
+            <a:r>
               <a:rPr lang="en-US" altLang="en-US" sz="1200" dirty="0">
                 <a:latin typeface="Courier New" panose="02070309020205020404" pitchFamily="49" charset="0"/>
                 <a:cs typeface="Courier New" panose="02070309020205020404" pitchFamily="49" charset="0"/>
               </a:rPr>
               <a:t>/</a:t>
-            </a:r>
-            <a:r>
-              <a:rPr lang="en-US" altLang="en-US" sz="1200" dirty="0" err="1">
-                <a:latin typeface="Courier New" panose="02070309020205020404" pitchFamily="49" charset="0"/>
-                <a:cs typeface="Courier New" panose="02070309020205020404" pitchFamily="49" charset="0"/>
-              </a:rPr>
-              <a:t>ltakacs</a:t>
-            </a:r>
-            <a:r>
-              <a:rPr lang="en-US" altLang="en-US" sz="1200" dirty="0">
-                <a:latin typeface="Courier New" panose="02070309020205020404" pitchFamily="49" charset="0"/>
-                <a:cs typeface="Courier New" panose="02070309020205020404" pitchFamily="49" charset="0"/>
-              </a:rPr>
-              <a:t>/</a:t>
-            </a:r>
-            <a:r>
-              <a:rPr lang="en-US" altLang="en-US" sz="1200" dirty="0" err="1">
-                <a:latin typeface="Courier New" panose="02070309020205020404" pitchFamily="49" charset="0"/>
-                <a:cs typeface="Courier New" panose="02070309020205020404" pitchFamily="49" charset="0"/>
-              </a:rPr>
-              <a:t>bcs</a:t>
-            </a:r>
-            <a:r>
-              <a:rPr lang="en-US" altLang="en-US" sz="1200" dirty="0">
-                <a:latin typeface="Courier New" panose="02070309020205020404" pitchFamily="49" charset="0"/>
-                <a:cs typeface="Courier New" panose="02070309020205020404" pitchFamily="49" charset="0"/>
-              </a:rPr>
-              <a:t>/Icarus-NLv2/Icarus-NLv2_EASE/SMAP_EASEv2_M36/</a:t>
             </a:r>
             <a:endParaRPr lang="en-US" altLang="en-US" sz="1800" dirty="0">
               <a:latin typeface="Courier New" panose="02070309020205020404" pitchFamily="49" charset="0"/>
@@ -44429,7 +44655,7 @@
           <p:cNvPr id="5" name="TextBox 1">
             <a:extLst>
               <a:ext uri="{FF2B5EF4-FFF2-40B4-BE49-F238E27FC236}">
-                <a16:creationId xmlns:a16="http://schemas.microsoft.com/office/drawing/2014/main" id="{4EDCE236-8364-E44A-8759-8BB938FE9C32}"/>
+                <a16:creationId xmlns="" xmlns:a16="http://schemas.microsoft.com/office/drawing/2014/main" id="{4EDCE236-8364-E44A-8759-8BB938FE9C32}"/>
               </a:ext>
             </a:extLst>
           </p:cNvPr>
@@ -45622,7 +45848,7 @@
           <p:cNvPr id="4" name="TextBox 1">
             <a:extLst>
               <a:ext uri="{FF2B5EF4-FFF2-40B4-BE49-F238E27FC236}">
-                <a16:creationId xmlns:a16="http://schemas.microsoft.com/office/drawing/2014/main" id="{EF205DC1-FB95-604F-BD4A-3FC5D361C450}"/>
+                <a16:creationId xmlns="" xmlns:a16="http://schemas.microsoft.com/office/drawing/2014/main" id="{EF205DC1-FB95-604F-BD4A-3FC5D361C450}"/>
               </a:ext>
             </a:extLst>
           </p:cNvPr>
@@ -46075,7 +46301,7 @@
   <a:extraClrSchemeLst/>
   <a:extLst>
     <a:ext uri="{05A4C25C-085E-4340-85A3-A5531E510DB2}">
-      <thm15:themeFamily xmlns:thm15="http://schemas.microsoft.com/office/thememl/2012/main" name="Office Theme" id="{62F939B6-93AF-4DB8-9C6B-D6C7DFDC589F}" vid="{4A3C46E8-61CC-4603-A589-7422A47A8E4A}"/>
+      <thm15:themeFamily xmlns="" xmlns:thm15="http://schemas.microsoft.com/office/thememl/2012/main" name="Office Theme" id="{62F939B6-93AF-4DB8-9C6B-D6C7DFDC589F}" vid="{4A3C46E8-61CC-4603-A589-7422A47A8E4A}"/>
     </a:ext>
   </a:extLst>
 </a:theme>
@@ -46336,7 +46562,7 @@
   <a:extraClrSchemeLst/>
   <a:extLst>
     <a:ext uri="{05A4C25C-085E-4340-85A3-A5531E510DB2}">
-      <thm15:themeFamily xmlns:thm15="http://schemas.microsoft.com/office/thememl/2012/main" name="Office Theme" id="{62F939B6-93AF-4DB8-9C6B-D6C7DFDC589F}" vid="{4A3C46E8-61CC-4603-A589-7422A47A8E4A}"/>
+      <thm15:themeFamily xmlns="" xmlns:thm15="http://schemas.microsoft.com/office/thememl/2012/main" name="Office Theme" id="{62F939B6-93AF-4DB8-9C6B-D6C7DFDC589F}" vid="{4A3C46E8-61CC-4603-A589-7422A47A8E4A}"/>
     </a:ext>
   </a:extLst>
 </a:theme>

</xml_diff>